<commit_message>
adding lesson 0, lesson 3b
</commit_message>
<xml_diff>
--- a/lessons/lesson7/Lesson7_APIs.pptx
+++ b/lessons/lesson7/Lesson7_APIs.pptx
@@ -9638,8 +9638,36 @@
         </p:blipFill>
         <p:spPr>
           <a:xfrm>
-            <a:off x="2969088" y="1155062"/>
+            <a:off x="404313" y="1266562"/>
             <a:ext cx="3205825" cy="3205825"/>
+          </a:xfrm>
+          <a:prstGeom prst="rect">
+            <a:avLst/>
+          </a:prstGeom>
+          <a:noFill/>
+          <a:ln>
+            <a:noFill/>
+          </a:ln>
+        </p:spPr>
+      </p:pic>
+      <p:pic>
+        <p:nvPicPr>
+          <p:cNvPr id="116" name="Google Shape;116;p21"/>
+          <p:cNvPicPr preferRelativeResize="0"/>
+          <p:nvPr/>
+        </p:nvPicPr>
+        <p:blipFill>
+          <a:blip r:embed="rId4">
+            <a:alphaModFix/>
+          </a:blip>
+          <a:stretch>
+            <a:fillRect/>
+          </a:stretch>
+        </p:blipFill>
+        <p:spPr>
+          <a:xfrm>
+            <a:off x="4614045" y="1635050"/>
+            <a:ext cx="3808150" cy="2764600"/>
           </a:xfrm>
           <a:prstGeom prst="rect">
             <a:avLst/>

</xml_diff>